<commit_message>
Removed extraneous text box from summary presentation
</commit_message>
<xml_diff>
--- a/Documentation/Group 002-5 Summary.pptx
+++ b/Documentation/Group 002-5 Summary.pptx
@@ -4846,62 +4846,6 @@
           </a:prstGeom>
         </p:spPr>
       </p:pic>
-      <p:sp>
-        <p:nvSpPr>
-          <p:cNvPr id="2" name="Rectangle 1">
-            <a:extLst>
-              <a:ext uri="{FF2B5EF4-FFF2-40B4-BE49-F238E27FC236}">
-                <a16:creationId xmlns:a16="http://schemas.microsoft.com/office/drawing/2014/main" id="{8EB0242B-74DE-4160-8EE6-C5D337325083}"/>
-              </a:ext>
-            </a:extLst>
-          </p:cNvPr>
-          <p:cNvSpPr/>
-          <p:nvPr/>
-        </p:nvSpPr>
-        <p:spPr>
-          <a:xfrm>
-            <a:off x="-1318845" y="782516"/>
-            <a:ext cx="914400" cy="914400"/>
-          </a:xfrm>
-          <a:prstGeom prst="rect">
-            <a:avLst/>
-          </a:prstGeom>
-        </p:spPr>
-        <p:style>
-          <a:lnRef idx="2">
-            <a:schemeClr val="accent1">
-              <a:shade val="50000"/>
-            </a:schemeClr>
-          </a:lnRef>
-          <a:fillRef idx="1">
-            <a:schemeClr val="accent1"/>
-          </a:fillRef>
-          <a:effectRef idx="0">
-            <a:schemeClr val="accent1"/>
-          </a:effectRef>
-          <a:fontRef idx="minor">
-            <a:schemeClr val="lt1"/>
-          </a:fontRef>
-        </p:style>
-        <p:txBody>
-          <a:bodyPr rtlCol="0" anchor="ctr"/>
-          <a:lstStyle/>
-          <a:p>
-            <a:pPr algn="ctr"/>
-            <a:r>
-              <a:rPr lang="en-US" dirty="0"/>
-              <a:t>Project Summary Report</a:t>
-            </a:r>
-          </a:p>
-          <a:p>
-            <a:pPr algn="ctr"/>
-            <a:r>
-              <a:rPr lang="en-US" dirty="0"/>
-              <a:t>Group 002-5</a:t>
-            </a:r>
-          </a:p>
-        </p:txBody>
-      </p:sp>
       <p:grpSp>
         <p:nvGrpSpPr>
           <p:cNvPr id="4" name="Group 3">

</xml_diff>

<commit_message>
Added slide for Randall
</commit_message>
<xml_diff>
--- a/Documentation/Group 002-5 Summary.pptx
+++ b/Documentation/Group 002-5 Summary.pptx
@@ -10,6 +10,7 @@
     <p:sldId id="258" r:id="rId4"/>
     <p:sldId id="259" r:id="rId5"/>
     <p:sldId id="260" r:id="rId6"/>
+    <p:sldId id="261" r:id="rId7"/>
   </p:sldIdLst>
   <p:sldSz cx="9144000" cy="6858000" type="screen4x3"/>
   <p:notesSz cx="6858000" cy="9144000"/>
@@ -5394,7 +5395,7 @@
               </a:pPr>
               <a:r>
                 <a:rPr lang="en-US" dirty="0"/>
-                <a:t>Communication via GroupMe</a:t>
+                <a:t>Communication via GroupMe and GitHub</a:t>
               </a:r>
             </a:p>
             <a:p>
@@ -5421,6 +5422,19 @@
               <a:r>
                 <a:rPr lang="en-US" dirty="0"/>
                 <a:t>Moderate balance of skills</a:t>
+              </a:r>
+            </a:p>
+            <a:p>
+              <a:pPr marL="285750" indent="-285750">
+                <a:lnSpc>
+                  <a:spcPct val="200000"/>
+                </a:lnSpc>
+                <a:buFont typeface="Arial" panose="020B0604020202020204" pitchFamily="34" charset="0"/>
+                <a:buChar char="•"/>
+              </a:pPr>
+              <a:r>
+                <a:rPr lang="en-US" dirty="0"/>
+                <a:t>Occasional disagreements about where code should be headed</a:t>
               </a:r>
             </a:p>
             <a:p>
@@ -5683,6 +5697,270 @@
     <p:extLst>
       <p:ext uri="{BB962C8B-B14F-4D97-AF65-F5344CB8AC3E}">
         <p14:creationId xmlns:p14="http://schemas.microsoft.com/office/powerpoint/2010/main" val="2814714624"/>
+      </p:ext>
+    </p:extLst>
+  </p:cSld>
+  <p:clrMapOvr>
+    <a:masterClrMapping/>
+  </p:clrMapOvr>
+</p:sld>
+</file>
+
+<file path=ppt/slides/slide6.xml><?xml version="1.0" encoding="utf-8"?>
+<p:sld xmlns:a="http://schemas.openxmlformats.org/drawingml/2006/main" xmlns:r="http://schemas.openxmlformats.org/officeDocument/2006/relationships" xmlns:p="http://schemas.openxmlformats.org/presentationml/2006/main">
+  <p:cSld>
+    <p:spTree>
+      <p:nvGrpSpPr>
+        <p:cNvPr id="1" name=""/>
+        <p:cNvGrpSpPr/>
+        <p:nvPr/>
+      </p:nvGrpSpPr>
+      <p:grpSpPr>
+        <a:xfrm>
+          <a:off x="0" y="0"/>
+          <a:ext cx="0" cy="0"/>
+          <a:chOff x="0" y="0"/>
+          <a:chExt cx="0" cy="0"/>
+        </a:xfrm>
+      </p:grpSpPr>
+      <p:pic>
+        <p:nvPicPr>
+          <p:cNvPr id="7" name="Picture 6" descr="A close up of text on a black background&#10;&#10;Description automatically generated">
+            <a:extLst>
+              <a:ext uri="{FF2B5EF4-FFF2-40B4-BE49-F238E27FC236}">
+                <a16:creationId xmlns:a16="http://schemas.microsoft.com/office/drawing/2014/main" id="{42C820EF-25A2-4216-A0BE-A99F17C537D6}"/>
+              </a:ext>
+            </a:extLst>
+          </p:cNvPr>
+          <p:cNvPicPr>
+            <a:picLocks noChangeAspect="1"/>
+          </p:cNvPicPr>
+          <p:nvPr/>
+        </p:nvPicPr>
+        <p:blipFill>
+          <a:blip r:embed="rId2">
+            <a:alphaModFix amt="20000"/>
+            <a:extLst>
+              <a:ext uri="{28A0092B-C50C-407E-A947-70E740481C1C}">
+                <a14:useLocalDpi xmlns:a14="http://schemas.microsoft.com/office/drawing/2010/main" val="0"/>
+              </a:ext>
+            </a:extLst>
+          </a:blip>
+          <a:stretch>
+            <a:fillRect/>
+          </a:stretch>
+        </p:blipFill>
+        <p:spPr>
+          <a:xfrm>
+            <a:off x="0" y="0"/>
+            <a:ext cx="9144000" cy="6858000"/>
+          </a:xfrm>
+          <a:prstGeom prst="rect">
+            <a:avLst/>
+          </a:prstGeom>
+        </p:spPr>
+      </p:pic>
+      <p:grpSp>
+        <p:nvGrpSpPr>
+          <p:cNvPr id="4" name="Group 3">
+            <a:extLst>
+              <a:ext uri="{FF2B5EF4-FFF2-40B4-BE49-F238E27FC236}">
+                <a16:creationId xmlns:a16="http://schemas.microsoft.com/office/drawing/2014/main" id="{0582DBA0-754F-4E83-A86B-3048642DBFB9}"/>
+              </a:ext>
+            </a:extLst>
+          </p:cNvPr>
+          <p:cNvGrpSpPr/>
+          <p:nvPr/>
+        </p:nvGrpSpPr>
+        <p:grpSpPr>
+          <a:xfrm>
+            <a:off x="914400" y="914400"/>
+            <a:ext cx="7315200" cy="5029200"/>
+            <a:chOff x="914400" y="914400"/>
+            <a:chExt cx="7315200" cy="5029200"/>
+          </a:xfrm>
+        </p:grpSpPr>
+        <p:sp>
+          <p:nvSpPr>
+            <p:cNvPr id="5" name="Rectangle 4">
+              <a:extLst>
+                <a:ext uri="{FF2B5EF4-FFF2-40B4-BE49-F238E27FC236}">
+                  <a16:creationId xmlns:a16="http://schemas.microsoft.com/office/drawing/2014/main" id="{4E3C8D7D-9566-41A0-8A9E-8AFE209B2749}"/>
+                </a:ext>
+              </a:extLst>
+            </p:cNvPr>
+            <p:cNvSpPr/>
+            <p:nvPr/>
+          </p:nvSpPr>
+          <p:spPr>
+            <a:xfrm>
+              <a:off x="914400" y="914400"/>
+              <a:ext cx="7315200" cy="5029200"/>
+            </a:xfrm>
+            <a:prstGeom prst="rect">
+              <a:avLst/>
+            </a:prstGeom>
+            <a:solidFill>
+              <a:schemeClr val="bg1"/>
+            </a:solidFill>
+            <a:ln>
+              <a:noFill/>
+            </a:ln>
+          </p:spPr>
+          <p:style>
+            <a:lnRef idx="2">
+              <a:schemeClr val="accent1">
+                <a:shade val="50000"/>
+              </a:schemeClr>
+            </a:lnRef>
+            <a:fillRef idx="1">
+              <a:schemeClr val="accent1"/>
+            </a:fillRef>
+            <a:effectRef idx="0">
+              <a:schemeClr val="accent1"/>
+            </a:effectRef>
+            <a:fontRef idx="minor">
+              <a:schemeClr val="lt1"/>
+            </a:fontRef>
+          </p:style>
+          <p:txBody>
+            <a:bodyPr rtlCol="0" anchor="ctr"/>
+            <a:lstStyle/>
+            <a:p>
+              <a:pPr algn="ctr"/>
+              <a:endParaRPr lang="en-US"/>
+            </a:p>
+          </p:txBody>
+        </p:sp>
+        <p:sp>
+          <p:nvSpPr>
+            <p:cNvPr id="2" name="Rectangle 1">
+              <a:extLst>
+                <a:ext uri="{FF2B5EF4-FFF2-40B4-BE49-F238E27FC236}">
+                  <a16:creationId xmlns:a16="http://schemas.microsoft.com/office/drawing/2014/main" id="{A9212079-EF87-4ECC-A758-04A54E0BA920}"/>
+                </a:ext>
+              </a:extLst>
+            </p:cNvPr>
+            <p:cNvSpPr/>
+            <p:nvPr/>
+          </p:nvSpPr>
+          <p:spPr>
+            <a:xfrm>
+              <a:off x="914400" y="914400"/>
+              <a:ext cx="7315200" cy="5029200"/>
+            </a:xfrm>
+            <a:prstGeom prst="rect">
+              <a:avLst/>
+            </a:prstGeom>
+            <a:solidFill>
+              <a:schemeClr val="tx1">
+                <a:alpha val="75000"/>
+              </a:schemeClr>
+            </a:solidFill>
+            <a:ln>
+              <a:noFill/>
+            </a:ln>
+          </p:spPr>
+          <p:style>
+            <a:lnRef idx="2">
+              <a:schemeClr val="accent1">
+                <a:shade val="50000"/>
+              </a:schemeClr>
+            </a:lnRef>
+            <a:fillRef idx="1">
+              <a:schemeClr val="accent1"/>
+            </a:fillRef>
+            <a:effectRef idx="0">
+              <a:schemeClr val="accent1"/>
+            </a:effectRef>
+            <a:fontRef idx="minor">
+              <a:schemeClr val="lt1"/>
+            </a:fontRef>
+          </p:style>
+          <p:txBody>
+            <a:bodyPr rtlCol="0" anchor="t" anchorCtr="0"/>
+            <a:lstStyle/>
+            <a:p>
+              <a:pPr algn="ctr">
+                <a:lnSpc>
+                  <a:spcPct val="200000"/>
+                </a:lnSpc>
+              </a:pPr>
+              <a:r>
+                <a:rPr lang="en-US" sz="2400" dirty="0"/>
+                <a:t>Randall Ferree</a:t>
+              </a:r>
+            </a:p>
+            <a:p>
+              <a:pPr marL="285750" indent="-285750">
+                <a:buFont typeface="Arial" panose="020B0604020202020204" pitchFamily="34" charset="0"/>
+                <a:buChar char="•"/>
+              </a:pPr>
+              <a:endParaRPr lang="en-US" dirty="0"/>
+            </a:p>
+            <a:p>
+              <a:pPr marL="285750" indent="-285750">
+                <a:buFont typeface="Arial" panose="020B0604020202020204" pitchFamily="34" charset="0"/>
+                <a:buChar char="•"/>
+              </a:pPr>
+              <a:r>
+                <a:rPr lang="en-US" dirty="0"/>
+                <a:t>Interesting parts: working with others who come from different engineering backgrounds and perspectives.</a:t>
+              </a:r>
+            </a:p>
+            <a:p>
+              <a:pPr marL="285750" indent="-285750">
+                <a:buFont typeface="Arial" panose="020B0604020202020204" pitchFamily="34" charset="0"/>
+                <a:buChar char="•"/>
+              </a:pPr>
+              <a:endParaRPr lang="en-US" dirty="0"/>
+            </a:p>
+            <a:p>
+              <a:pPr marL="285750" indent="-285750">
+                <a:buFont typeface="Arial" panose="020B0604020202020204" pitchFamily="34" charset="0"/>
+                <a:buChar char="•"/>
+              </a:pPr>
+              <a:r>
+                <a:rPr lang="en-US" dirty="0"/>
+                <a:t>Difficult parts: also the most difficult parts is working with others who come from those different perspectives. Sometimes we provide each other with good points and other times we can’t see eye to eye on things on what we believe is the best path.</a:t>
+              </a:r>
+            </a:p>
+            <a:p>
+              <a:pPr marL="285750" indent="-285750">
+                <a:buFont typeface="Arial" panose="020B0604020202020204" pitchFamily="34" charset="0"/>
+                <a:buChar char="•"/>
+              </a:pPr>
+              <a:endParaRPr lang="en-US" dirty="0"/>
+            </a:p>
+            <a:p>
+              <a:pPr marL="285750" indent="-285750">
+                <a:buFont typeface="Arial" panose="020B0604020202020204" pitchFamily="34" charset="0"/>
+                <a:buChar char="•"/>
+              </a:pPr>
+              <a:endParaRPr lang="en-US" dirty="0"/>
+            </a:p>
+            <a:p>
+              <a:pPr marL="285750" indent="-285750">
+                <a:buFont typeface="Arial" panose="020B0604020202020204" pitchFamily="34" charset="0"/>
+                <a:buChar char="•"/>
+              </a:pPr>
+              <a:r>
+                <a:rPr lang="en-US" dirty="0"/>
+                <a:t>Skills: better communication, negotiating, </a:t>
+              </a:r>
+              <a:r>
+                <a:rPr lang="en-US"/>
+                <a:t>and planning</a:t>
+              </a:r>
+              <a:endParaRPr lang="en-US" dirty="0"/>
+            </a:p>
+          </p:txBody>
+        </p:sp>
+      </p:grpSp>
+    </p:spTree>
+    <p:extLst>
+      <p:ext uri="{BB962C8B-B14F-4D97-AF65-F5344CB8AC3E}">
+        <p14:creationId xmlns:p14="http://schemas.microsoft.com/office/powerpoint/2010/main" val="2924195726"/>
       </p:ext>
     </p:extLst>
   </p:cSld>

</xml_diff>

<commit_message>
Added Robbie slide; cleaned up formatting
</commit_message>
<xml_diff>
--- a/Documentation/Group 002-5 Summary.pptx
+++ b/Documentation/Group 002-5 Summary.pptx
@@ -10,9 +10,10 @@
     <p:sldId id="258" r:id="rId4"/>
     <p:sldId id="259" r:id="rId5"/>
     <p:sldId id="264" r:id="rId6"/>
-    <p:sldId id="260" r:id="rId7"/>
-    <p:sldId id="261" r:id="rId8"/>
+    <p:sldId id="261" r:id="rId7"/>
+    <p:sldId id="262" r:id="rId8"/>
     <p:sldId id="263" r:id="rId9"/>
+    <p:sldId id="260" r:id="rId10"/>
   </p:sldIdLst>
   <p:sldSz cx="9144000" cy="6858000" type="screen4x3"/>
   <p:notesSz cx="6858000" cy="9144000"/>
@@ -4872,8 +4873,8 @@
         </p:nvGrpSpPr>
         <p:grpSpPr>
           <a:xfrm>
-            <a:off x="5596128" y="3338623"/>
-            <a:ext cx="2866292" cy="2227169"/>
+            <a:off x="5596128" y="4334256"/>
+            <a:ext cx="2866292" cy="1840046"/>
             <a:chOff x="914400" y="914400"/>
             <a:chExt cx="7315200" cy="5029200"/>
           </a:xfrm>
@@ -4922,7 +4923,7 @@
             </a:fontRef>
           </p:style>
           <p:txBody>
-            <a:bodyPr rtlCol="0" anchor="ctr"/>
+            <a:bodyPr rtlCol="0" anchor="ctr" anchorCtr="0"/>
             <a:lstStyle/>
             <a:p>
               <a:pPr algn="ctr"/>
@@ -4976,7 +4977,7 @@
             </a:fontRef>
           </p:style>
           <p:txBody>
-            <a:bodyPr rtlCol="0" anchor="t" anchorCtr="0"/>
+            <a:bodyPr rtlCol="0" anchor="ctr" anchorCtr="0"/>
             <a:lstStyle/>
             <a:p>
               <a:pPr algn="ctr"/>
@@ -5405,14 +5406,22 @@
             <a:bodyPr rtlCol="0" anchor="t" anchorCtr="0"/>
             <a:lstStyle/>
             <a:p>
-              <a:pPr>
+              <a:pPr algn="ctr">
                 <a:lnSpc>
                   <a:spcPct val="200000"/>
                 </a:lnSpc>
               </a:pPr>
               <a:r>
-                <a:rPr lang="en-US" dirty="0"/>
-                <a:t>Group Dynamics:</a:t>
+                <a:rPr lang="en-US" sz="2130" b="1" dirty="0">
+                  <a:effectLst>
+                    <a:outerShdw blurRad="38100" dist="38100" dir="2700000" algn="tl">
+                      <a:srgbClr val="000000">
+                        <a:alpha val="43137"/>
+                      </a:srgbClr>
+                    </a:outerShdw>
+                  </a:effectLst>
+                </a:rPr>
+                <a:t>Group Dynamics</a:t>
               </a:r>
             </a:p>
             <a:p>
@@ -5671,14 +5680,22 @@
             <a:bodyPr rtlCol="0" anchor="t" anchorCtr="0"/>
             <a:lstStyle/>
             <a:p>
-              <a:pPr>
+              <a:pPr algn="ctr">
                 <a:lnSpc>
                   <a:spcPct val="200000"/>
                 </a:lnSpc>
               </a:pPr>
               <a:r>
-                <a:rPr lang="en-US" dirty="0"/>
-                <a:t>Quality and completeness:</a:t>
+                <a:rPr lang="en-US" sz="2130" b="1" dirty="0">
+                  <a:effectLst>
+                    <a:outerShdw blurRad="38100" dist="38100" dir="2700000" algn="tl">
+                      <a:srgbClr val="000000">
+                        <a:alpha val="43137"/>
+                      </a:srgbClr>
+                    </a:outerShdw>
+                  </a:effectLst>
+                </a:rPr>
+                <a:t>Quality and Completeness</a:t>
               </a:r>
             </a:p>
             <a:p>
@@ -5727,10 +5744,10 @@
       </p:grpSpPr>
       <p:pic>
         <p:nvPicPr>
-          <p:cNvPr id="3" name="Picture 2" descr="A close up of text on a black background&#10;&#10;Description automatically generated">
+          <p:cNvPr id="7" name="Picture 6" descr="A close up of text on a black background&#10;&#10;Description automatically generated">
             <a:extLst>
               <a:ext uri="{FF2B5EF4-FFF2-40B4-BE49-F238E27FC236}">
-                <a16:creationId xmlns:a16="http://schemas.microsoft.com/office/drawing/2014/main" id="{7EA968D9-2440-402B-B30F-36AD708886D9}"/>
+                <a16:creationId xmlns:a16="http://schemas.microsoft.com/office/drawing/2014/main" id="{42C820EF-25A2-4216-A0BE-A99F17C537D6}"/>
               </a:ext>
             </a:extLst>
           </p:cNvPr>
@@ -5762,183 +5779,210 @@
           </a:prstGeom>
         </p:spPr>
       </p:pic>
-      <p:sp>
-        <p:nvSpPr>
-          <p:cNvPr id="8" name="TextBox 7">
+      <p:grpSp>
+        <p:nvGrpSpPr>
+          <p:cNvPr id="4" name="Group 3">
             <a:extLst>
               <a:ext uri="{FF2B5EF4-FFF2-40B4-BE49-F238E27FC236}">
-                <a16:creationId xmlns:a16="http://schemas.microsoft.com/office/drawing/2014/main" id="{5D56B24F-7652-4B3E-B1AE-7F6AE83E060D}"/>
+                <a16:creationId xmlns:a16="http://schemas.microsoft.com/office/drawing/2014/main" id="{0582DBA0-754F-4E83-A86B-3048642DBFB9}"/>
               </a:ext>
             </a:extLst>
           </p:cNvPr>
-          <p:cNvSpPr txBox="1"/>
+          <p:cNvGrpSpPr/>
           <p:nvPr/>
-        </p:nvSpPr>
-        <p:spPr>
+        </p:nvGrpSpPr>
+        <p:grpSpPr>
           <a:xfrm>
-            <a:off x="4810230" y="728315"/>
-            <a:ext cx="3871546" cy="1815882"/>
+            <a:off x="914400" y="914400"/>
+            <a:ext cx="7315200" cy="5029200"/>
+            <a:chOff x="914400" y="914400"/>
+            <a:chExt cx="7315200" cy="5029200"/>
           </a:xfrm>
-          <a:prstGeom prst="rect">
-            <a:avLst/>
-          </a:prstGeom>
-          <a:solidFill>
-            <a:schemeClr val="accent1">
-              <a:lumMod val="60000"/>
-              <a:lumOff val="40000"/>
-            </a:schemeClr>
-          </a:solidFill>
-        </p:spPr>
-        <p:txBody>
-          <a:bodyPr wrap="square" rtlCol="0">
-            <a:spAutoFit/>
-          </a:bodyPr>
-          <a:lstStyle/>
-          <a:p>
-            <a:pPr algn="ctr"/>
-            <a:endParaRPr lang="en-US" sz="2800" b="1" dirty="0">
-              <a:effectLst>
-                <a:outerShdw blurRad="38100" dist="38100" dir="2700000" algn="tl">
-                  <a:srgbClr val="000000">
-                    <a:alpha val="43137"/>
-                  </a:srgbClr>
-                </a:outerShdw>
-              </a:effectLst>
-            </a:endParaRPr>
-          </a:p>
-          <a:p>
-            <a:pPr algn="ctr"/>
-            <a:r>
-              <a:rPr lang="en-US" sz="2800" b="1" dirty="0"/>
-              <a:t>Gameplay of two separate clients</a:t>
-            </a:r>
-          </a:p>
-          <a:p>
-            <a:pPr algn="ctr"/>
-            <a:endParaRPr lang="en-US" sz="2800" b="1" dirty="0">
-              <a:effectLst>
-                <a:outerShdw blurRad="38100" dist="38100" dir="2700000" algn="tl">
-                  <a:srgbClr val="000000">
-                    <a:alpha val="43137"/>
-                  </a:srgbClr>
-                </a:outerShdw>
-              </a:effectLst>
-            </a:endParaRPr>
-          </a:p>
-        </p:txBody>
-      </p:sp>
-      <p:pic>
-        <p:nvPicPr>
-          <p:cNvPr id="10" name="Picture 9" descr="A picture containing room, building, scene, cake&#10;&#10;Description automatically generated">
-            <a:extLst>
-              <a:ext uri="{FF2B5EF4-FFF2-40B4-BE49-F238E27FC236}">
-                <a16:creationId xmlns:a16="http://schemas.microsoft.com/office/drawing/2014/main" id="{34280546-6629-402E-98EA-94D9F9B2296C}"/>
-              </a:ext>
-            </a:extLst>
-          </p:cNvPr>
-          <p:cNvPicPr>
-            <a:picLocks noChangeAspect="1"/>
-          </p:cNvPicPr>
-          <p:nvPr/>
-        </p:nvPicPr>
-        <p:blipFill>
-          <a:blip r:embed="rId3">
-            <a:extLst>
-              <a:ext uri="{28A0092B-C50C-407E-A947-70E740481C1C}">
-                <a14:useLocalDpi xmlns:a14="http://schemas.microsoft.com/office/drawing/2010/main" val="0"/>
-              </a:ext>
-            </a:extLst>
-          </a:blip>
-          <a:stretch>
-            <a:fillRect/>
-          </a:stretch>
-        </p:blipFill>
-        <p:spPr>
-          <a:xfrm>
-            <a:off x="489898" y="4462819"/>
-            <a:ext cx="3521120" cy="1883390"/>
-          </a:xfrm>
-          <a:prstGeom prst="rect">
-            <a:avLst/>
-          </a:prstGeom>
-        </p:spPr>
-      </p:pic>
-      <p:pic>
-        <p:nvPicPr>
-          <p:cNvPr id="12" name="Picture 11" descr="A screenshot of a cell phone&#10;&#10;Description automatically generated">
-            <a:extLst>
-              <a:ext uri="{FF2B5EF4-FFF2-40B4-BE49-F238E27FC236}">
-                <a16:creationId xmlns:a16="http://schemas.microsoft.com/office/drawing/2014/main" id="{84C88CD2-726B-4AD7-9FC3-85A64CE70D5C}"/>
-              </a:ext>
-            </a:extLst>
-          </p:cNvPr>
-          <p:cNvPicPr>
-            <a:picLocks noChangeAspect="1"/>
-          </p:cNvPicPr>
-          <p:nvPr/>
-        </p:nvPicPr>
-        <p:blipFill>
-          <a:blip r:embed="rId4">
-            <a:extLst>
-              <a:ext uri="{28A0092B-C50C-407E-A947-70E740481C1C}">
-                <a14:useLocalDpi xmlns:a14="http://schemas.microsoft.com/office/drawing/2010/main" val="0"/>
-              </a:ext>
-            </a:extLst>
-          </a:blip>
-          <a:stretch>
-            <a:fillRect/>
-          </a:stretch>
-        </p:blipFill>
-        <p:spPr>
-          <a:xfrm>
-            <a:off x="4500916" y="2783994"/>
-            <a:ext cx="4352163" cy="3562215"/>
-          </a:xfrm>
-          <a:prstGeom prst="rect">
-            <a:avLst/>
-          </a:prstGeom>
-        </p:spPr>
-      </p:pic>
-      <p:pic>
-        <p:nvPicPr>
-          <p:cNvPr id="14" name="Picture 13" descr="A screenshot of a cell phone&#10;&#10;Description automatically generated">
-            <a:extLst>
-              <a:ext uri="{FF2B5EF4-FFF2-40B4-BE49-F238E27FC236}">
-                <a16:creationId xmlns:a16="http://schemas.microsoft.com/office/drawing/2014/main" id="{F2A49DF7-1814-4266-90FD-8D5BD0E007BA}"/>
-              </a:ext>
-            </a:extLst>
-          </p:cNvPr>
-          <p:cNvPicPr>
-            <a:picLocks noChangeAspect="1"/>
-          </p:cNvPicPr>
-          <p:nvPr/>
-        </p:nvPicPr>
-        <p:blipFill>
-          <a:blip r:embed="rId5">
-            <a:extLst>
-              <a:ext uri="{28A0092B-C50C-407E-A947-70E740481C1C}">
-                <a14:useLocalDpi xmlns:a14="http://schemas.microsoft.com/office/drawing/2010/main" val="0"/>
-              </a:ext>
-            </a:extLst>
-          </a:blip>
-          <a:stretch>
-            <a:fillRect/>
-          </a:stretch>
-        </p:blipFill>
-        <p:spPr>
-          <a:xfrm>
-            <a:off x="271624" y="206287"/>
-            <a:ext cx="3938371" cy="3222713"/>
-          </a:xfrm>
-          <a:prstGeom prst="rect">
-            <a:avLst/>
-          </a:prstGeom>
-        </p:spPr>
-      </p:pic>
+        </p:grpSpPr>
+        <p:sp>
+          <p:nvSpPr>
+            <p:cNvPr id="5" name="Rectangle 4">
+              <a:extLst>
+                <a:ext uri="{FF2B5EF4-FFF2-40B4-BE49-F238E27FC236}">
+                  <a16:creationId xmlns:a16="http://schemas.microsoft.com/office/drawing/2014/main" id="{4E3C8D7D-9566-41A0-8A9E-8AFE209B2749}"/>
+                </a:ext>
+              </a:extLst>
+            </p:cNvPr>
+            <p:cNvSpPr/>
+            <p:nvPr/>
+          </p:nvSpPr>
+          <p:spPr>
+            <a:xfrm>
+              <a:off x="914400" y="914400"/>
+              <a:ext cx="7315200" cy="5029200"/>
+            </a:xfrm>
+            <a:prstGeom prst="rect">
+              <a:avLst/>
+            </a:prstGeom>
+            <a:solidFill>
+              <a:schemeClr val="bg1"/>
+            </a:solidFill>
+            <a:ln>
+              <a:noFill/>
+            </a:ln>
+          </p:spPr>
+          <p:style>
+            <a:lnRef idx="2">
+              <a:schemeClr val="accent1">
+                <a:shade val="50000"/>
+              </a:schemeClr>
+            </a:lnRef>
+            <a:fillRef idx="1">
+              <a:schemeClr val="accent1"/>
+            </a:fillRef>
+            <a:effectRef idx="0">
+              <a:schemeClr val="accent1"/>
+            </a:effectRef>
+            <a:fontRef idx="minor">
+              <a:schemeClr val="lt1"/>
+            </a:fontRef>
+          </p:style>
+          <p:txBody>
+            <a:bodyPr rtlCol="0" anchor="ctr"/>
+            <a:lstStyle/>
+            <a:p>
+              <a:pPr algn="ctr"/>
+              <a:endParaRPr lang="en-US"/>
+            </a:p>
+          </p:txBody>
+        </p:sp>
+        <p:sp>
+          <p:nvSpPr>
+            <p:cNvPr id="2" name="Rectangle 1">
+              <a:extLst>
+                <a:ext uri="{FF2B5EF4-FFF2-40B4-BE49-F238E27FC236}">
+                  <a16:creationId xmlns:a16="http://schemas.microsoft.com/office/drawing/2014/main" id="{A9212079-EF87-4ECC-A758-04A54E0BA920}"/>
+                </a:ext>
+              </a:extLst>
+            </p:cNvPr>
+            <p:cNvSpPr/>
+            <p:nvPr/>
+          </p:nvSpPr>
+          <p:spPr>
+            <a:xfrm>
+              <a:off x="914400" y="914400"/>
+              <a:ext cx="7315200" cy="5029200"/>
+            </a:xfrm>
+            <a:prstGeom prst="rect">
+              <a:avLst/>
+            </a:prstGeom>
+            <a:solidFill>
+              <a:schemeClr val="tx1">
+                <a:alpha val="75000"/>
+              </a:schemeClr>
+            </a:solidFill>
+            <a:ln>
+              <a:noFill/>
+            </a:ln>
+          </p:spPr>
+          <p:style>
+            <a:lnRef idx="2">
+              <a:schemeClr val="accent1">
+                <a:shade val="50000"/>
+              </a:schemeClr>
+            </a:lnRef>
+            <a:fillRef idx="1">
+              <a:schemeClr val="accent1"/>
+            </a:fillRef>
+            <a:effectRef idx="0">
+              <a:schemeClr val="accent1"/>
+            </a:effectRef>
+            <a:fontRef idx="minor">
+              <a:schemeClr val="lt1"/>
+            </a:fontRef>
+          </p:style>
+          <p:txBody>
+            <a:bodyPr rtlCol="0" anchor="t" anchorCtr="0"/>
+            <a:lstStyle/>
+            <a:p>
+              <a:pPr algn="ctr">
+                <a:lnSpc>
+                  <a:spcPct val="200000"/>
+                </a:lnSpc>
+              </a:pPr>
+              <a:r>
+                <a:rPr lang="en-US" sz="2130" b="1" dirty="0">
+                  <a:effectLst>
+                    <a:outerShdw blurRad="38100" dist="38100" dir="2700000" algn="tl">
+                      <a:srgbClr val="000000">
+                        <a:alpha val="43137"/>
+                      </a:srgbClr>
+                    </a:outerShdw>
+                  </a:effectLst>
+                </a:rPr>
+                <a:t>Randall Ferree</a:t>
+              </a:r>
+            </a:p>
+            <a:p>
+              <a:pPr marL="285750" indent="-285750">
+                <a:buFont typeface="Arial" panose="020B0604020202020204" pitchFamily="34" charset="0"/>
+                <a:buChar char="•"/>
+              </a:pPr>
+              <a:endParaRPr lang="en-US" dirty="0"/>
+            </a:p>
+            <a:p>
+              <a:pPr marL="285750" indent="-285750">
+                <a:buFont typeface="Arial" panose="020B0604020202020204" pitchFamily="34" charset="0"/>
+                <a:buChar char="•"/>
+              </a:pPr>
+              <a:r>
+                <a:rPr lang="en-US" dirty="0"/>
+                <a:t>Interesting parts: working with others who come from different engineering backgrounds and perspectives.</a:t>
+              </a:r>
+            </a:p>
+            <a:p>
+              <a:pPr marL="285750" indent="-285750">
+                <a:buFont typeface="Arial" panose="020B0604020202020204" pitchFamily="34" charset="0"/>
+                <a:buChar char="•"/>
+              </a:pPr>
+              <a:endParaRPr lang="en-US" dirty="0"/>
+            </a:p>
+            <a:p>
+              <a:pPr marL="285750" indent="-285750">
+                <a:buFont typeface="Arial" panose="020B0604020202020204" pitchFamily="34" charset="0"/>
+                <a:buChar char="•"/>
+              </a:pPr>
+              <a:r>
+                <a:rPr lang="en-US" dirty="0"/>
+                <a:t>Difficult parts: also the most difficult parts is working with others who come from those different perspectives. Sometimes we provide each other with good points and other times we can’t see eye to eye on things on what we believe is the best path.</a:t>
+              </a:r>
+            </a:p>
+            <a:p>
+              <a:pPr marL="285750" indent="-285750">
+                <a:buFont typeface="Arial" panose="020B0604020202020204" pitchFamily="34" charset="0"/>
+                <a:buChar char="•"/>
+              </a:pPr>
+              <a:endParaRPr lang="en-US" dirty="0"/>
+            </a:p>
+            <a:p>
+              <a:pPr marL="285750" indent="-285750">
+                <a:buFont typeface="Arial" panose="020B0604020202020204" pitchFamily="34" charset="0"/>
+                <a:buChar char="•"/>
+              </a:pPr>
+              <a:endParaRPr lang="en-US" dirty="0"/>
+            </a:p>
+            <a:p>
+              <a:pPr marL="285750" indent="-285750">
+                <a:buFont typeface="Arial" panose="020B0604020202020204" pitchFamily="34" charset="0"/>
+                <a:buChar char="•"/>
+              </a:pPr>
+              <a:r>
+                <a:rPr lang="en-US" dirty="0"/>
+                <a:t>Skills: better communication, negotiating, and planning</a:t>
+              </a:r>
+            </a:p>
+          </p:txBody>
+        </p:sp>
+      </p:grpSp>
     </p:spTree>
     <p:extLst>
       <p:ext uri="{BB962C8B-B14F-4D97-AF65-F5344CB8AC3E}">
-        <p14:creationId xmlns:p14="http://schemas.microsoft.com/office/powerpoint/2010/main" val="2814714624"/>
+        <p14:creationId xmlns:p14="http://schemas.microsoft.com/office/powerpoint/2010/main" val="2924195726"/>
       </p:ext>
     </p:extLst>
   </p:cSld>
@@ -6129,8 +6173,16 @@
                 </a:lnSpc>
               </a:pPr>
               <a:r>
-                <a:rPr lang="en-US" sz="2400" dirty="0"/>
-                <a:t>Randall Ferree</a:t>
+                <a:rPr lang="en-US" sz="2130" b="1" dirty="0">
+                  <a:effectLst>
+                    <a:outerShdw blurRad="38100" dist="38100" dir="2700000" algn="tl">
+                      <a:srgbClr val="000000">
+                        <a:alpha val="43137"/>
+                      </a:srgbClr>
+                    </a:outerShdw>
+                  </a:effectLst>
+                </a:rPr>
+                <a:t>Robbie Frazier</a:t>
               </a:r>
             </a:p>
             <a:p>
@@ -6147,7 +6199,7 @@
               </a:pPr>
               <a:r>
                 <a:rPr lang="en-US" dirty="0"/>
-                <a:t>Interesting parts: working with others who come from different engineering backgrounds and perspectives.</a:t>
+                <a:t>Most Interesting: It was interesting to see how different students viewed and approached problems.</a:t>
               </a:r>
             </a:p>
             <a:p>
@@ -6164,15 +6216,8 @@
               </a:pPr>
               <a:r>
                 <a:rPr lang="en-US" dirty="0"/>
-                <a:t>Difficult parts: also the most difficult parts is working with others who come from those different perspectives. Sometimes we provide each other with good points and other times we can’t see eye to eye on things on what we believe is the best path.</a:t>
+                <a:t>Most Difficult: A seemingly small project quickly developed into a significant effort. This was my first exposure to a client/server application, and the communication between the two was significantly more challenging that I anticipated.</a:t>
               </a:r>
-            </a:p>
-            <a:p>
-              <a:pPr marL="285750" indent="-285750">
-                <a:buFont typeface="Arial" panose="020B0604020202020204" pitchFamily="34" charset="0"/>
-                <a:buChar char="•"/>
-              </a:pPr>
-              <a:endParaRPr lang="en-US" dirty="0"/>
             </a:p>
             <a:p>
               <a:pPr marL="285750" indent="-285750">
@@ -6188,13 +6233,8 @@
               </a:pPr>
               <a:r>
                 <a:rPr lang="en-US" dirty="0"/>
-                <a:t>Skills: better communication, negotiating, </a:t>
+                <a:t>Skills Learned: The project helped me understand the importance of well-defined requirements and design.</a:t>
               </a:r>
-              <a:r>
-                <a:rPr lang="en-US"/>
-                <a:t>and planning</a:t>
-              </a:r>
-              <a:endParaRPr lang="en-US" dirty="0"/>
             </a:p>
           </p:txBody>
         </p:sp>
@@ -6202,7 +6242,7 @@
     </p:spTree>
     <p:extLst>
       <p:ext uri="{BB962C8B-B14F-4D97-AF65-F5344CB8AC3E}">
-        <p14:creationId xmlns:p14="http://schemas.microsoft.com/office/powerpoint/2010/main" val="2924195726"/>
+        <p14:creationId xmlns:p14="http://schemas.microsoft.com/office/powerpoint/2010/main" val="326636631"/>
       </p:ext>
     </p:extLst>
   </p:cSld>
@@ -6280,7 +6320,7 @@
         </p:nvGrpSpPr>
         <p:grpSpPr>
           <a:xfrm>
-            <a:off x="914400" y="914399"/>
+            <a:off x="914400" y="691117"/>
             <a:ext cx="7315200" cy="5475767"/>
             <a:chOff x="914400" y="914400"/>
             <a:chExt cx="7315200" cy="5029200"/>
@@ -6393,7 +6433,15 @@
                 </a:lnSpc>
               </a:pPr>
               <a:r>
-                <a:rPr lang="en-US" sz="2400" dirty="0"/>
+                <a:rPr lang="en-US" sz="2130" b="1" dirty="0">
+                  <a:effectLst>
+                    <a:outerShdw blurRad="38100" dist="38100" dir="2700000" algn="tl">
+                      <a:srgbClr val="000000">
+                        <a:alpha val="43137"/>
+                      </a:srgbClr>
+                    </a:outerShdw>
+                  </a:effectLst>
+                </a:rPr>
                 <a:t>Shishir Acharya</a:t>
               </a:r>
             </a:p>
@@ -6463,6 +6511,314 @@
     <p:extLst>
       <p:ext uri="{BB962C8B-B14F-4D97-AF65-F5344CB8AC3E}">
         <p14:creationId xmlns:p14="http://schemas.microsoft.com/office/powerpoint/2010/main" val="641191130"/>
+      </p:ext>
+    </p:extLst>
+  </p:cSld>
+  <p:clrMapOvr>
+    <a:masterClrMapping/>
+  </p:clrMapOvr>
+</p:sld>
+</file>
+
+<file path=ppt/slides/slide9.xml><?xml version="1.0" encoding="utf-8"?>
+<p:sld xmlns:a="http://schemas.openxmlformats.org/drawingml/2006/main" xmlns:r="http://schemas.openxmlformats.org/officeDocument/2006/relationships" xmlns:p="http://schemas.openxmlformats.org/presentationml/2006/main">
+  <p:cSld>
+    <p:spTree>
+      <p:nvGrpSpPr>
+        <p:cNvPr id="1" name=""/>
+        <p:cNvGrpSpPr/>
+        <p:nvPr/>
+      </p:nvGrpSpPr>
+      <p:grpSpPr>
+        <a:xfrm>
+          <a:off x="0" y="0"/>
+          <a:ext cx="0" cy="0"/>
+          <a:chOff x="0" y="0"/>
+          <a:chExt cx="0" cy="0"/>
+        </a:xfrm>
+      </p:grpSpPr>
+      <p:pic>
+        <p:nvPicPr>
+          <p:cNvPr id="3" name="Picture 2" descr="A close up of text on a black background&#10;&#10;Description automatically generated">
+            <a:extLst>
+              <a:ext uri="{FF2B5EF4-FFF2-40B4-BE49-F238E27FC236}">
+                <a16:creationId xmlns:a16="http://schemas.microsoft.com/office/drawing/2014/main" id="{7EA968D9-2440-402B-B30F-36AD708886D9}"/>
+              </a:ext>
+            </a:extLst>
+          </p:cNvPr>
+          <p:cNvPicPr>
+            <a:picLocks noChangeAspect="1"/>
+          </p:cNvPicPr>
+          <p:nvPr/>
+        </p:nvPicPr>
+        <p:blipFill>
+          <a:blip r:embed="rId2">
+            <a:alphaModFix amt="20000"/>
+            <a:extLst>
+              <a:ext uri="{28A0092B-C50C-407E-A947-70E740481C1C}">
+                <a14:useLocalDpi xmlns:a14="http://schemas.microsoft.com/office/drawing/2010/main" val="0"/>
+              </a:ext>
+            </a:extLst>
+          </a:blip>
+          <a:stretch>
+            <a:fillRect/>
+          </a:stretch>
+        </p:blipFill>
+        <p:spPr>
+          <a:xfrm>
+            <a:off x="0" y="0"/>
+            <a:ext cx="9144000" cy="6858000"/>
+          </a:xfrm>
+          <a:prstGeom prst="rect">
+            <a:avLst/>
+          </a:prstGeom>
+        </p:spPr>
+      </p:pic>
+      <p:grpSp>
+        <p:nvGrpSpPr>
+          <p:cNvPr id="4" name="Group 3">
+            <a:extLst>
+              <a:ext uri="{FF2B5EF4-FFF2-40B4-BE49-F238E27FC236}">
+                <a16:creationId xmlns:a16="http://schemas.microsoft.com/office/drawing/2014/main" id="{7E94334A-B265-42EC-AEA2-9FB12A13DA59}"/>
+              </a:ext>
+            </a:extLst>
+          </p:cNvPr>
+          <p:cNvGrpSpPr/>
+          <p:nvPr/>
+        </p:nvGrpSpPr>
+        <p:grpSpPr>
+          <a:xfrm>
+            <a:off x="4800722" y="1050583"/>
+            <a:ext cx="3871546" cy="1408176"/>
+            <a:chOff x="4810230" y="728315"/>
+            <a:chExt cx="3871546" cy="1408176"/>
+          </a:xfrm>
+        </p:grpSpPr>
+        <p:sp>
+          <p:nvSpPr>
+            <p:cNvPr id="2" name="Rectangle 1">
+              <a:extLst>
+                <a:ext uri="{FF2B5EF4-FFF2-40B4-BE49-F238E27FC236}">
+                  <a16:creationId xmlns:a16="http://schemas.microsoft.com/office/drawing/2014/main" id="{0A09DF11-F052-448F-A82B-D43ED5DE9D4E}"/>
+                </a:ext>
+              </a:extLst>
+            </p:cNvPr>
+            <p:cNvSpPr/>
+            <p:nvPr/>
+          </p:nvSpPr>
+          <p:spPr>
+            <a:xfrm>
+              <a:off x="4810230" y="728315"/>
+              <a:ext cx="3867912" cy="1408176"/>
+            </a:xfrm>
+            <a:prstGeom prst="rect">
+              <a:avLst/>
+            </a:prstGeom>
+            <a:solidFill>
+              <a:schemeClr val="bg1"/>
+            </a:solidFill>
+            <a:ln>
+              <a:noFill/>
+            </a:ln>
+          </p:spPr>
+          <p:style>
+            <a:lnRef idx="2">
+              <a:schemeClr val="accent1">
+                <a:shade val="50000"/>
+              </a:schemeClr>
+            </a:lnRef>
+            <a:fillRef idx="1">
+              <a:schemeClr val="accent1"/>
+            </a:fillRef>
+            <a:effectRef idx="0">
+              <a:schemeClr val="accent1"/>
+            </a:effectRef>
+            <a:fontRef idx="minor">
+              <a:schemeClr val="lt1"/>
+            </a:fontRef>
+          </p:style>
+          <p:txBody>
+            <a:bodyPr rtlCol="0" anchor="ctr"/>
+            <a:lstStyle/>
+            <a:p>
+              <a:pPr algn="ctr"/>
+              <a:endParaRPr lang="en-US"/>
+            </a:p>
+          </p:txBody>
+        </p:sp>
+        <p:sp>
+          <p:nvSpPr>
+            <p:cNvPr id="8" name="TextBox 7">
+              <a:extLst>
+                <a:ext uri="{FF2B5EF4-FFF2-40B4-BE49-F238E27FC236}">
+                  <a16:creationId xmlns:a16="http://schemas.microsoft.com/office/drawing/2014/main" id="{5D56B24F-7652-4B3E-B1AE-7F6AE83E060D}"/>
+                </a:ext>
+              </a:extLst>
+            </p:cNvPr>
+            <p:cNvSpPr txBox="1"/>
+            <p:nvPr/>
+          </p:nvSpPr>
+          <p:spPr>
+            <a:xfrm>
+              <a:off x="4810230" y="728315"/>
+              <a:ext cx="3871546" cy="1403461"/>
+            </a:xfrm>
+            <a:prstGeom prst="rect">
+              <a:avLst/>
+            </a:prstGeom>
+            <a:solidFill>
+              <a:schemeClr val="tx1">
+                <a:alpha val="75000"/>
+              </a:schemeClr>
+            </a:solidFill>
+          </p:spPr>
+          <p:txBody>
+            <a:bodyPr wrap="square" rtlCol="0">
+              <a:spAutoFit/>
+            </a:bodyPr>
+            <a:lstStyle/>
+            <a:p>
+              <a:pPr algn="ctr"/>
+              <a:endParaRPr lang="en-US" sz="2130" b="1" dirty="0">
+                <a:solidFill>
+                  <a:schemeClr val="bg1"/>
+                </a:solidFill>
+              </a:endParaRPr>
+            </a:p>
+            <a:p>
+              <a:pPr algn="ctr"/>
+              <a:r>
+                <a:rPr lang="en-US" sz="2130" b="1" dirty="0">
+                  <a:solidFill>
+                    <a:schemeClr val="bg1"/>
+                  </a:solidFill>
+                </a:rPr>
+                <a:t>Gameplay with two separate clients</a:t>
+              </a:r>
+            </a:p>
+            <a:p>
+              <a:pPr algn="ctr"/>
+              <a:endParaRPr lang="en-US" sz="2130" b="1" dirty="0">
+                <a:solidFill>
+                  <a:schemeClr val="bg1"/>
+                </a:solidFill>
+              </a:endParaRPr>
+            </a:p>
+          </p:txBody>
+        </p:sp>
+      </p:grpSp>
+      <p:pic>
+        <p:nvPicPr>
+          <p:cNvPr id="10" name="Picture 9" descr="A picture containing room, building, scene, cake&#10;&#10;Description automatically generated">
+            <a:extLst>
+              <a:ext uri="{FF2B5EF4-FFF2-40B4-BE49-F238E27FC236}">
+                <a16:creationId xmlns:a16="http://schemas.microsoft.com/office/drawing/2014/main" id="{34280546-6629-402E-98EA-94D9F9B2296C}"/>
+              </a:ext>
+            </a:extLst>
+          </p:cNvPr>
+          <p:cNvPicPr>
+            <a:picLocks noChangeAspect="1"/>
+          </p:cNvPicPr>
+          <p:nvPr/>
+        </p:nvPicPr>
+        <p:blipFill>
+          <a:blip r:embed="rId3">
+            <a:extLst>
+              <a:ext uri="{28A0092B-C50C-407E-A947-70E740481C1C}">
+                <a14:useLocalDpi xmlns:a14="http://schemas.microsoft.com/office/drawing/2010/main" val="0"/>
+              </a:ext>
+            </a:extLst>
+          </a:blip>
+          <a:stretch>
+            <a:fillRect/>
+          </a:stretch>
+        </p:blipFill>
+        <p:spPr>
+          <a:xfrm>
+            <a:off x="648487" y="4159298"/>
+            <a:ext cx="3521120" cy="1883390"/>
+          </a:xfrm>
+          <a:prstGeom prst="rect">
+            <a:avLst/>
+          </a:prstGeom>
+        </p:spPr>
+      </p:pic>
+      <p:pic>
+        <p:nvPicPr>
+          <p:cNvPr id="12" name="Picture 11" descr="A screenshot of a cell phone&#10;&#10;Description automatically generated">
+            <a:extLst>
+              <a:ext uri="{FF2B5EF4-FFF2-40B4-BE49-F238E27FC236}">
+                <a16:creationId xmlns:a16="http://schemas.microsoft.com/office/drawing/2014/main" id="{84C88CD2-726B-4AD7-9FC3-85A64CE70D5C}"/>
+              </a:ext>
+            </a:extLst>
+          </p:cNvPr>
+          <p:cNvPicPr>
+            <a:picLocks noChangeAspect="1"/>
+          </p:cNvPicPr>
+          <p:nvPr/>
+        </p:nvPicPr>
+        <p:blipFill>
+          <a:blip r:embed="rId4">
+            <a:extLst>
+              <a:ext uri="{28A0092B-C50C-407E-A947-70E740481C1C}">
+                <a14:useLocalDpi xmlns:a14="http://schemas.microsoft.com/office/drawing/2010/main" val="0"/>
+              </a:ext>
+            </a:extLst>
+          </a:blip>
+          <a:stretch>
+            <a:fillRect/>
+          </a:stretch>
+        </p:blipFill>
+        <p:spPr>
+          <a:xfrm>
+            <a:off x="4690872" y="3145536"/>
+            <a:ext cx="4091247" cy="3348658"/>
+          </a:xfrm>
+          <a:prstGeom prst="rect">
+            <a:avLst/>
+          </a:prstGeom>
+        </p:spPr>
+      </p:pic>
+      <p:pic>
+        <p:nvPicPr>
+          <p:cNvPr id="14" name="Picture 13" descr="A screenshot of a cell phone&#10;&#10;Description automatically generated">
+            <a:extLst>
+              <a:ext uri="{FF2B5EF4-FFF2-40B4-BE49-F238E27FC236}">
+                <a16:creationId xmlns:a16="http://schemas.microsoft.com/office/drawing/2014/main" id="{F2A49DF7-1814-4266-90FD-8D5BD0E007BA}"/>
+              </a:ext>
+            </a:extLst>
+          </p:cNvPr>
+          <p:cNvPicPr>
+            <a:picLocks noChangeAspect="1"/>
+          </p:cNvPicPr>
+          <p:nvPr/>
+        </p:nvPicPr>
+        <p:blipFill>
+          <a:blip r:embed="rId5">
+            <a:extLst>
+              <a:ext uri="{28A0092B-C50C-407E-A947-70E740481C1C}">
+                <a14:useLocalDpi xmlns:a14="http://schemas.microsoft.com/office/drawing/2010/main" val="0"/>
+              </a:ext>
+            </a:extLst>
+          </a:blip>
+          <a:stretch>
+            <a:fillRect/>
+          </a:stretch>
+        </p:blipFill>
+        <p:spPr>
+          <a:xfrm>
+            <a:off x="365759" y="365760"/>
+            <a:ext cx="4086576" cy="3343987"/>
+          </a:xfrm>
+          <a:prstGeom prst="rect">
+            <a:avLst/>
+          </a:prstGeom>
+        </p:spPr>
+      </p:pic>
+    </p:spTree>
+    <p:extLst>
+      <p:ext uri="{BB962C8B-B14F-4D97-AF65-F5344CB8AC3E}">
+        <p14:creationId xmlns:p14="http://schemas.microsoft.com/office/powerpoint/2010/main" val="2814714624"/>
       </p:ext>
     </p:extLst>
   </p:cSld>

</xml_diff>